<commit_message>
hi, hs, ht equations
</commit_message>
<xml_diff>
--- a/Equations.pptx
+++ b/Equations.pptx
@@ -8,6 +8,7 @@
     <p:sldId id="256" r:id="rId2"/>
     <p:sldId id="257" r:id="rId3"/>
     <p:sldId id="258" r:id="rId4"/>
+    <p:sldId id="259" r:id="rId5"/>
   </p:sldIdLst>
   <p:sldSz cx="12192000" cy="6858000"/>
   <p:notesSz cx="6858000" cy="9144000"/>
@@ -4726,6 +4727,1201 @@
 </p:sld>
 </file>
 
+<file path=ppt/slides/slide4.xml><?xml version="1.0" encoding="utf-8"?>
+<p:sld xmlns:a="http://schemas.openxmlformats.org/drawingml/2006/main" xmlns:r="http://schemas.openxmlformats.org/officeDocument/2006/relationships" xmlns:p="http://schemas.openxmlformats.org/presentationml/2006/main">
+  <p:cSld>
+    <p:spTree>
+      <p:nvGrpSpPr>
+        <p:cNvPr id="1" name=""/>
+        <p:cNvGrpSpPr/>
+        <p:nvPr/>
+      </p:nvGrpSpPr>
+      <p:grpSpPr>
+        <a:xfrm>
+          <a:off x="0" y="0"/>
+          <a:ext cx="0" cy="0"/>
+          <a:chOff x="0" y="0"/>
+          <a:chExt cx="0" cy="0"/>
+        </a:xfrm>
+      </p:grpSpPr>
+      <p:grpSp>
+        <p:nvGrpSpPr>
+          <p:cNvPr id="6" name="Group 5"/>
+          <p:cNvGrpSpPr/>
+          <p:nvPr/>
+        </p:nvGrpSpPr>
+        <p:grpSpPr>
+          <a:xfrm>
+            <a:off x="809397" y="527858"/>
+            <a:ext cx="4672754" cy="1445336"/>
+            <a:chOff x="2477776" y="896826"/>
+            <a:chExt cx="4672754" cy="1445336"/>
+          </a:xfrm>
+        </p:grpSpPr>
+        <mc:AlternateContent xmlns:mc="http://schemas.openxmlformats.org/markup-compatibility/2006">
+          <mc:Choice xmlns:a14="http://schemas.microsoft.com/office/drawing/2010/main" Requires="a14">
+            <p:sp>
+              <p:nvSpPr>
+                <p:cNvPr id="4" name="TextBox 3"/>
+                <p:cNvSpPr txBox="1"/>
+                <p:nvPr/>
+              </p:nvSpPr>
+              <p:spPr>
+                <a:xfrm>
+                  <a:off x="2477776" y="896826"/>
+                  <a:ext cx="4041555" cy="563872"/>
+                </a:xfrm>
+                <a:prstGeom prst="rect">
+                  <a:avLst/>
+                </a:prstGeom>
+                <a:noFill/>
+              </p:spPr>
+              <p:txBody>
+                <a:bodyPr wrap="none" lIns="0" tIns="0" rIns="0" bIns="0" rtlCol="0">
+                  <a:spAutoFit/>
+                </a:bodyPr>
+                <a:lstStyle/>
+                <a:p>
+                  <a14:m>
+                    <m:oMathPara xmlns:m="http://schemas.openxmlformats.org/officeDocument/2006/math">
+                      <m:oMathParaPr>
+                        <m:jc m:val="centerGroup"/>
+                      </m:oMathParaPr>
+                      <m:oMath xmlns:m="http://schemas.openxmlformats.org/officeDocument/2006/math">
+                        <m:r>
+                          <a:rPr lang="en-US" i="1" smtClean="0">
+                            <a:latin typeface="Cambria Math" panose="02040503050406030204" pitchFamily="18" charset="0"/>
+                          </a:rPr>
+                          <m:t>=</m:t>
+                        </m:r>
+                        <m:f>
+                          <m:fPr>
+                            <m:ctrlPr>
+                              <a:rPr lang="en-US" i="1" smtClean="0">
+                                <a:latin typeface="Cambria Math" panose="02040503050406030204" pitchFamily="18" charset="0"/>
+                              </a:rPr>
+                            </m:ctrlPr>
+                          </m:fPr>
+                          <m:num>
+                            <m:sSub>
+                              <m:sSubPr>
+                                <m:ctrlPr>
+                                  <a:rPr lang="en-US" i="1" smtClean="0">
+                                    <a:latin typeface="Cambria Math" panose="02040503050406030204" pitchFamily="18" charset="0"/>
+                                  </a:rPr>
+                                </m:ctrlPr>
+                              </m:sSubPr>
+                              <m:e>
+                                <m:r>
+                                  <a:rPr lang="en-US" b="0" i="1" smtClean="0">
+                                    <a:latin typeface="Cambria Math" panose="02040503050406030204" pitchFamily="18" charset="0"/>
+                                  </a:rPr>
+                                  <m:t>𝐻</m:t>
+                                </m:r>
+                              </m:e>
+                              <m:sub>
+                                <m:r>
+                                  <a:rPr lang="en-US" b="0" i="1" smtClean="0">
+                                    <a:latin typeface="Cambria Math" panose="02040503050406030204" pitchFamily="18" charset="0"/>
+                                  </a:rPr>
+                                  <m:t>𝑜𝑏𝑠</m:t>
+                                </m:r>
+                                <m:r>
+                                  <a:rPr lang="en-US" b="0" i="1" smtClean="0">
+                                    <a:latin typeface="Cambria Math" panose="02040503050406030204" pitchFamily="18" charset="0"/>
+                                  </a:rPr>
+                                  <m:t>1</m:t>
+                                </m:r>
+                              </m:sub>
+                            </m:sSub>
+                            <m:r>
+                              <a:rPr lang="en-US" i="1" smtClean="0">
+                                <a:latin typeface="Cambria Math" panose="02040503050406030204" pitchFamily="18" charset="0"/>
+                                <a:ea typeface="Cambria Math" panose="02040503050406030204" pitchFamily="18" charset="0"/>
+                              </a:rPr>
+                              <m:t>×</m:t>
+                            </m:r>
+                            <m:sSub>
+                              <m:sSubPr>
+                                <m:ctrlPr>
+                                  <a:rPr lang="en-US" i="1" smtClean="0">
+                                    <a:latin typeface="Cambria Math" panose="02040503050406030204" pitchFamily="18" charset="0"/>
+                                    <a:ea typeface="Cambria Math" panose="02040503050406030204" pitchFamily="18" charset="0"/>
+                                  </a:rPr>
+                                </m:ctrlPr>
+                              </m:sSubPr>
+                              <m:e>
+                                <m:r>
+                                  <a:rPr lang="en-US" b="0" i="1" smtClean="0">
+                                    <a:latin typeface="Cambria Math" panose="02040503050406030204" pitchFamily="18" charset="0"/>
+                                    <a:ea typeface="Cambria Math" panose="02040503050406030204" pitchFamily="18" charset="0"/>
+                                  </a:rPr>
+                                  <m:t>𝑁</m:t>
+                                </m:r>
+                              </m:e>
+                              <m:sub>
+                                <m:r>
+                                  <a:rPr lang="en-US" b="0" i="1" smtClean="0">
+                                    <a:latin typeface="Cambria Math" panose="02040503050406030204" pitchFamily="18" charset="0"/>
+                                    <a:ea typeface="Cambria Math" panose="02040503050406030204" pitchFamily="18" charset="0"/>
+                                  </a:rPr>
+                                  <m:t>1</m:t>
+                                </m:r>
+                              </m:sub>
+                            </m:sSub>
+                            <m:r>
+                              <a:rPr lang="en-US" b="0" i="1" smtClean="0">
+                                <a:latin typeface="Cambria Math" panose="02040503050406030204" pitchFamily="18" charset="0"/>
+                                <a:ea typeface="Cambria Math" panose="02040503050406030204" pitchFamily="18" charset="0"/>
+                              </a:rPr>
+                              <m:t>+</m:t>
+                            </m:r>
+                            <m:sSub>
+                              <m:sSubPr>
+                                <m:ctrlPr>
+                                  <a:rPr lang="en-US" b="0" i="1" smtClean="0">
+                                    <a:latin typeface="Cambria Math" panose="02040503050406030204" pitchFamily="18" charset="0"/>
+                                    <a:ea typeface="Cambria Math" panose="02040503050406030204" pitchFamily="18" charset="0"/>
+                                  </a:rPr>
+                                </m:ctrlPr>
+                              </m:sSubPr>
+                              <m:e>
+                                <m:r>
+                                  <a:rPr lang="en-US" b="0" i="1" smtClean="0">
+                                    <a:latin typeface="Cambria Math" panose="02040503050406030204" pitchFamily="18" charset="0"/>
+                                    <a:ea typeface="Cambria Math" panose="02040503050406030204" pitchFamily="18" charset="0"/>
+                                  </a:rPr>
+                                  <m:t>𝐻</m:t>
+                                </m:r>
+                              </m:e>
+                              <m:sub>
+                                <m:r>
+                                  <a:rPr lang="en-US" b="0" i="1" smtClean="0">
+                                    <a:latin typeface="Cambria Math" panose="02040503050406030204" pitchFamily="18" charset="0"/>
+                                    <a:ea typeface="Cambria Math" panose="02040503050406030204" pitchFamily="18" charset="0"/>
+                                  </a:rPr>
+                                  <m:t>𝑜𝑏𝑠</m:t>
+                                </m:r>
+                                <m:r>
+                                  <a:rPr lang="en-US" b="0" i="1" smtClean="0">
+                                    <a:latin typeface="Cambria Math" panose="02040503050406030204" pitchFamily="18" charset="0"/>
+                                    <a:ea typeface="Cambria Math" panose="02040503050406030204" pitchFamily="18" charset="0"/>
+                                  </a:rPr>
+                                  <m:t>2</m:t>
+                                </m:r>
+                              </m:sub>
+                            </m:sSub>
+                            <m:r>
+                              <a:rPr lang="en-US" b="0" i="1" smtClean="0">
+                                <a:latin typeface="Cambria Math" panose="02040503050406030204" pitchFamily="18" charset="0"/>
+                                <a:ea typeface="Cambria Math" panose="02040503050406030204" pitchFamily="18" charset="0"/>
+                              </a:rPr>
+                              <m:t>×</m:t>
+                            </m:r>
+                            <m:sSub>
+                              <m:sSubPr>
+                                <m:ctrlPr>
+                                  <a:rPr lang="en-US" b="0" i="1" smtClean="0">
+                                    <a:latin typeface="Cambria Math" panose="02040503050406030204" pitchFamily="18" charset="0"/>
+                                    <a:ea typeface="Cambria Math" panose="02040503050406030204" pitchFamily="18" charset="0"/>
+                                  </a:rPr>
+                                </m:ctrlPr>
+                              </m:sSubPr>
+                              <m:e>
+                                <m:r>
+                                  <a:rPr lang="en-US" b="0" i="1" smtClean="0">
+                                    <a:latin typeface="Cambria Math" panose="02040503050406030204" pitchFamily="18" charset="0"/>
+                                    <a:ea typeface="Cambria Math" panose="02040503050406030204" pitchFamily="18" charset="0"/>
+                                  </a:rPr>
+                                  <m:t>𝑁</m:t>
+                                </m:r>
+                              </m:e>
+                              <m:sub>
+                                <m:r>
+                                  <a:rPr lang="en-US" b="0" i="1" smtClean="0">
+                                    <a:latin typeface="Cambria Math" panose="02040503050406030204" pitchFamily="18" charset="0"/>
+                                    <a:ea typeface="Cambria Math" panose="02040503050406030204" pitchFamily="18" charset="0"/>
+                                  </a:rPr>
+                                  <m:t>2</m:t>
+                                </m:r>
+                              </m:sub>
+                            </m:sSub>
+                            <m:r>
+                              <a:rPr lang="en-US" b="0" i="1" smtClean="0">
+                                <a:latin typeface="Cambria Math" panose="02040503050406030204" pitchFamily="18" charset="0"/>
+                                <a:ea typeface="Cambria Math" panose="02040503050406030204" pitchFamily="18" charset="0"/>
+                              </a:rPr>
+                              <m:t>+</m:t>
+                            </m:r>
+                            <m:sSub>
+                              <m:sSubPr>
+                                <m:ctrlPr>
+                                  <a:rPr lang="en-US" b="0" i="1" smtClean="0">
+                                    <a:latin typeface="Cambria Math" panose="02040503050406030204" pitchFamily="18" charset="0"/>
+                                    <a:ea typeface="Cambria Math" panose="02040503050406030204" pitchFamily="18" charset="0"/>
+                                  </a:rPr>
+                                </m:ctrlPr>
+                              </m:sSubPr>
+                              <m:e>
+                                <m:r>
+                                  <a:rPr lang="en-US" b="0" i="1" smtClean="0">
+                                    <a:latin typeface="Cambria Math" panose="02040503050406030204" pitchFamily="18" charset="0"/>
+                                    <a:ea typeface="Cambria Math" panose="02040503050406030204" pitchFamily="18" charset="0"/>
+                                  </a:rPr>
+                                  <m:t>𝐻</m:t>
+                                </m:r>
+                              </m:e>
+                              <m:sub>
+                                <m:r>
+                                  <a:rPr lang="en-US" b="0" i="1" smtClean="0">
+                                    <a:latin typeface="Cambria Math" panose="02040503050406030204" pitchFamily="18" charset="0"/>
+                                    <a:ea typeface="Cambria Math" panose="02040503050406030204" pitchFamily="18" charset="0"/>
+                                  </a:rPr>
+                                  <m:t>𝑜𝑏𝑠</m:t>
+                                </m:r>
+                                <m:r>
+                                  <a:rPr lang="en-US" b="0" i="1" smtClean="0">
+                                    <a:latin typeface="Cambria Math" panose="02040503050406030204" pitchFamily="18" charset="0"/>
+                                    <a:ea typeface="Cambria Math" panose="02040503050406030204" pitchFamily="18" charset="0"/>
+                                  </a:rPr>
+                                  <m:t>3</m:t>
+                                </m:r>
+                              </m:sub>
+                            </m:sSub>
+                            <m:r>
+                              <a:rPr lang="en-US" b="0" i="1" smtClean="0">
+                                <a:latin typeface="Cambria Math" panose="02040503050406030204" pitchFamily="18" charset="0"/>
+                                <a:ea typeface="Cambria Math" panose="02040503050406030204" pitchFamily="18" charset="0"/>
+                              </a:rPr>
+                              <m:t>×</m:t>
+                            </m:r>
+                            <m:sSub>
+                              <m:sSubPr>
+                                <m:ctrlPr>
+                                  <a:rPr lang="en-US" b="0" i="1" smtClean="0">
+                                    <a:latin typeface="Cambria Math" panose="02040503050406030204" pitchFamily="18" charset="0"/>
+                                    <a:ea typeface="Cambria Math" panose="02040503050406030204" pitchFamily="18" charset="0"/>
+                                  </a:rPr>
+                                </m:ctrlPr>
+                              </m:sSubPr>
+                              <m:e>
+                                <m:r>
+                                  <a:rPr lang="en-US" b="0" i="1" smtClean="0">
+                                    <a:latin typeface="Cambria Math" panose="02040503050406030204" pitchFamily="18" charset="0"/>
+                                    <a:ea typeface="Cambria Math" panose="02040503050406030204" pitchFamily="18" charset="0"/>
+                                  </a:rPr>
+                                  <m:t>𝑁</m:t>
+                                </m:r>
+                              </m:e>
+                              <m:sub>
+                                <m:r>
+                                  <a:rPr lang="en-US" b="0" i="1" smtClean="0">
+                                    <a:latin typeface="Cambria Math" panose="02040503050406030204" pitchFamily="18" charset="0"/>
+                                    <a:ea typeface="Cambria Math" panose="02040503050406030204" pitchFamily="18" charset="0"/>
+                                  </a:rPr>
+                                  <m:t>3</m:t>
+                                </m:r>
+                              </m:sub>
+                            </m:sSub>
+                          </m:num>
+                          <m:den>
+                            <m:sSub>
+                              <m:sSubPr>
+                                <m:ctrlPr>
+                                  <a:rPr lang="en-US" i="1" smtClean="0">
+                                    <a:latin typeface="Cambria Math" panose="02040503050406030204" pitchFamily="18" charset="0"/>
+                                  </a:rPr>
+                                </m:ctrlPr>
+                              </m:sSubPr>
+                              <m:e>
+                                <m:r>
+                                  <a:rPr lang="en-US" b="0" i="1" smtClean="0">
+                                    <a:latin typeface="Cambria Math" panose="02040503050406030204" pitchFamily="18" charset="0"/>
+                                  </a:rPr>
+                                  <m:t>𝑁</m:t>
+                                </m:r>
+                              </m:e>
+                              <m:sub>
+                                <m:r>
+                                  <a:rPr lang="en-US" b="0" i="1" smtClean="0">
+                                    <a:latin typeface="Cambria Math" panose="02040503050406030204" pitchFamily="18" charset="0"/>
+                                  </a:rPr>
+                                  <m:t>𝑇𝑜𝑡𝑎𝑙</m:t>
+                                </m:r>
+                              </m:sub>
+                            </m:sSub>
+                          </m:den>
+                        </m:f>
+                      </m:oMath>
+                    </m:oMathPara>
+                  </a14:m>
+                  <a:endParaRPr lang="en-US" dirty="0"/>
+                </a:p>
+              </p:txBody>
+            </p:sp>
+          </mc:Choice>
+          <mc:Fallback>
+            <p:sp>
+              <p:nvSpPr>
+                <p:cNvPr id="4" name="TextBox 3"/>
+                <p:cNvSpPr txBox="1">
+                  <a:spLocks noRot="1" noChangeAspect="1" noMove="1" noResize="1" noEditPoints="1" noAdjustHandles="1" noChangeArrowheads="1" noChangeShapeType="1" noTextEdit="1"/>
+                </p:cNvSpPr>
+                <p:nvPr/>
+              </p:nvSpPr>
+              <p:spPr>
+                <a:xfrm>
+                  <a:off x="2477776" y="896826"/>
+                  <a:ext cx="4041555" cy="563872"/>
+                </a:xfrm>
+                <a:prstGeom prst="rect">
+                  <a:avLst/>
+                </a:prstGeom>
+                <a:blipFill>
+                  <a:blip r:embed="rId2"/>
+                  <a:stretch>
+                    <a:fillRect/>
+                  </a:stretch>
+                </a:blipFill>
+              </p:spPr>
+              <p:txBody>
+                <a:bodyPr/>
+                <a:lstStyle/>
+                <a:p>
+                  <a:r>
+                    <a:rPr lang="en-US">
+                      <a:noFill/>
+                    </a:rPr>
+                    <a:t> </a:t>
+                  </a:r>
+                </a:p>
+              </p:txBody>
+            </p:sp>
+          </mc:Fallback>
+        </mc:AlternateContent>
+        <mc:AlternateContent xmlns:mc="http://schemas.openxmlformats.org/markup-compatibility/2006">
+          <mc:Choice xmlns:a14="http://schemas.microsoft.com/office/drawing/2010/main" Requires="a14">
+            <p:sp>
+              <p:nvSpPr>
+                <p:cNvPr id="5" name="TextBox 4"/>
+                <p:cNvSpPr txBox="1"/>
+                <p:nvPr/>
+              </p:nvSpPr>
+              <p:spPr>
+                <a:xfrm>
+                  <a:off x="2477776" y="1816184"/>
+                  <a:ext cx="4672754" cy="525978"/>
+                </a:xfrm>
+                <a:prstGeom prst="rect">
+                  <a:avLst/>
+                </a:prstGeom>
+                <a:noFill/>
+              </p:spPr>
+              <p:txBody>
+                <a:bodyPr wrap="none" lIns="0" tIns="0" rIns="0" bIns="0" rtlCol="0">
+                  <a:spAutoFit/>
+                </a:bodyPr>
+                <a:lstStyle/>
+                <a:p>
+                  <a14:m>
+                    <m:oMathPara xmlns:m="http://schemas.openxmlformats.org/officeDocument/2006/math">
+                      <m:oMathParaPr>
+                        <m:jc m:val="centerGroup"/>
+                      </m:oMathParaPr>
+                      <m:oMath xmlns:m="http://schemas.openxmlformats.org/officeDocument/2006/math">
+                        <m:r>
+                          <a:rPr lang="en-US" i="1" smtClean="0">
+                            <a:latin typeface="Cambria Math" panose="02040503050406030204" pitchFamily="18" charset="0"/>
+                          </a:rPr>
+                          <m:t>=</m:t>
+                        </m:r>
+                        <m:f>
+                          <m:fPr>
+                            <m:ctrlPr>
+                              <a:rPr lang="en-US" i="1" smtClean="0">
+                                <a:latin typeface="Cambria Math" panose="02040503050406030204" pitchFamily="18" charset="0"/>
+                              </a:rPr>
+                            </m:ctrlPr>
+                          </m:fPr>
+                          <m:num>
+                            <m:r>
+                              <a:rPr lang="en-US" b="0" i="1" smtClean="0">
+                                <a:latin typeface="Cambria Math" panose="02040503050406030204" pitchFamily="18" charset="0"/>
+                              </a:rPr>
+                              <m:t>0.5∗500+0.3∗100+0.5∗1000</m:t>
+                            </m:r>
+                          </m:num>
+                          <m:den>
+                            <m:r>
+                              <a:rPr lang="en-US" b="0" i="1" smtClean="0">
+                                <a:latin typeface="Cambria Math" panose="02040503050406030204" pitchFamily="18" charset="0"/>
+                              </a:rPr>
+                              <m:t>1600</m:t>
+                            </m:r>
+                          </m:den>
+                        </m:f>
+                        <m:r>
+                          <a:rPr lang="en-US" b="0" i="1" smtClean="0">
+                            <a:latin typeface="Cambria Math" panose="02040503050406030204" pitchFamily="18" charset="0"/>
+                          </a:rPr>
+                          <m:t>=0.4875</m:t>
+                        </m:r>
+                      </m:oMath>
+                    </m:oMathPara>
+                  </a14:m>
+                  <a:endParaRPr lang="en-US" dirty="0"/>
+                </a:p>
+              </p:txBody>
+            </p:sp>
+          </mc:Choice>
+          <mc:Fallback>
+            <p:sp>
+              <p:nvSpPr>
+                <p:cNvPr id="5" name="TextBox 4"/>
+                <p:cNvSpPr txBox="1">
+                  <a:spLocks noRot="1" noChangeAspect="1" noMove="1" noResize="1" noEditPoints="1" noAdjustHandles="1" noChangeArrowheads="1" noChangeShapeType="1" noTextEdit="1"/>
+                </p:cNvSpPr>
+                <p:nvPr/>
+              </p:nvSpPr>
+              <p:spPr>
+                <a:xfrm>
+                  <a:off x="2477776" y="1816184"/>
+                  <a:ext cx="4672754" cy="525978"/>
+                </a:xfrm>
+                <a:prstGeom prst="rect">
+                  <a:avLst/>
+                </a:prstGeom>
+                <a:blipFill>
+                  <a:blip r:embed="rId3"/>
+                  <a:stretch>
+                    <a:fillRect/>
+                  </a:stretch>
+                </a:blipFill>
+              </p:spPr>
+              <p:txBody>
+                <a:bodyPr/>
+                <a:lstStyle/>
+                <a:p>
+                  <a:r>
+                    <a:rPr lang="en-US">
+                      <a:noFill/>
+                    </a:rPr>
+                    <a:t> </a:t>
+                  </a:r>
+                </a:p>
+              </p:txBody>
+            </p:sp>
+          </mc:Fallback>
+        </mc:AlternateContent>
+      </p:grpSp>
+      <p:grpSp>
+        <p:nvGrpSpPr>
+          <p:cNvPr id="9" name="Group 8"/>
+          <p:cNvGrpSpPr/>
+          <p:nvPr/>
+        </p:nvGrpSpPr>
+        <p:grpSpPr>
+          <a:xfrm>
+            <a:off x="75591" y="3613814"/>
+            <a:ext cx="5185715" cy="1410880"/>
+            <a:chOff x="75591" y="3613814"/>
+            <a:chExt cx="5185715" cy="1410880"/>
+          </a:xfrm>
+        </p:grpSpPr>
+        <mc:AlternateContent xmlns:mc="http://schemas.openxmlformats.org/markup-compatibility/2006">
+          <mc:Choice xmlns:a14="http://schemas.microsoft.com/office/drawing/2010/main" Requires="a14">
+            <p:sp>
+              <p:nvSpPr>
+                <p:cNvPr id="7" name="TextBox 6"/>
+                <p:cNvSpPr txBox="1"/>
+                <p:nvPr/>
+              </p:nvSpPr>
+              <p:spPr>
+                <a:xfrm>
+                  <a:off x="75591" y="3613814"/>
+                  <a:ext cx="4084836" cy="570926"/>
+                </a:xfrm>
+                <a:prstGeom prst="rect">
+                  <a:avLst/>
+                </a:prstGeom>
+                <a:noFill/>
+              </p:spPr>
+              <p:txBody>
+                <a:bodyPr wrap="none" lIns="0" tIns="0" rIns="0" bIns="0" rtlCol="0">
+                  <a:spAutoFit/>
+                </a:bodyPr>
+                <a:lstStyle/>
+                <a:p>
+                  <a14:m>
+                    <m:oMathPara xmlns:m="http://schemas.openxmlformats.org/officeDocument/2006/math">
+                      <m:oMathParaPr>
+                        <m:jc m:val="centerGroup"/>
+                      </m:oMathParaPr>
+                      <m:oMath xmlns:m="http://schemas.openxmlformats.org/officeDocument/2006/math">
+                        <m:r>
+                          <a:rPr lang="en-US" i="1" smtClean="0">
+                            <a:latin typeface="Cambria Math" panose="02040503050406030204" pitchFamily="18" charset="0"/>
+                          </a:rPr>
+                          <m:t>=</m:t>
+                        </m:r>
+                        <m:f>
+                          <m:fPr>
+                            <m:ctrlPr>
+                              <a:rPr lang="en-US" i="1" smtClean="0">
+                                <a:latin typeface="Cambria Math" panose="02040503050406030204" pitchFamily="18" charset="0"/>
+                              </a:rPr>
+                            </m:ctrlPr>
+                          </m:fPr>
+                          <m:num>
+                            <m:sSub>
+                              <m:sSubPr>
+                                <m:ctrlPr>
+                                  <a:rPr lang="en-US" i="1" smtClean="0">
+                                    <a:latin typeface="Cambria Math" panose="02040503050406030204" pitchFamily="18" charset="0"/>
+                                  </a:rPr>
+                                </m:ctrlPr>
+                              </m:sSubPr>
+                              <m:e>
+                                <m:r>
+                                  <a:rPr lang="en-US" b="0" i="1" smtClean="0">
+                                    <a:latin typeface="Cambria Math" panose="02040503050406030204" pitchFamily="18" charset="0"/>
+                                  </a:rPr>
+                                  <m:t>𝐻</m:t>
+                                </m:r>
+                              </m:e>
+                              <m:sub>
+                                <m:r>
+                                  <a:rPr lang="en-US" b="0" i="1" smtClean="0">
+                                    <a:latin typeface="Cambria Math" panose="02040503050406030204" pitchFamily="18" charset="0"/>
+                                  </a:rPr>
+                                  <m:t>𝑒𝑥𝑝</m:t>
+                                </m:r>
+                                <m:r>
+                                  <a:rPr lang="en-US" b="0" i="1" smtClean="0">
+                                    <a:latin typeface="Cambria Math" panose="02040503050406030204" pitchFamily="18" charset="0"/>
+                                  </a:rPr>
+                                  <m:t>1</m:t>
+                                </m:r>
+                              </m:sub>
+                            </m:sSub>
+                            <m:r>
+                              <a:rPr lang="en-US" i="1" smtClean="0">
+                                <a:latin typeface="Cambria Math" panose="02040503050406030204" pitchFamily="18" charset="0"/>
+                                <a:ea typeface="Cambria Math" panose="02040503050406030204" pitchFamily="18" charset="0"/>
+                              </a:rPr>
+                              <m:t>×</m:t>
+                            </m:r>
+                            <m:sSub>
+                              <m:sSubPr>
+                                <m:ctrlPr>
+                                  <a:rPr lang="en-US" i="1" smtClean="0">
+                                    <a:latin typeface="Cambria Math" panose="02040503050406030204" pitchFamily="18" charset="0"/>
+                                    <a:ea typeface="Cambria Math" panose="02040503050406030204" pitchFamily="18" charset="0"/>
+                                  </a:rPr>
+                                </m:ctrlPr>
+                              </m:sSubPr>
+                              <m:e>
+                                <m:r>
+                                  <a:rPr lang="en-US" b="0" i="1" smtClean="0">
+                                    <a:latin typeface="Cambria Math" panose="02040503050406030204" pitchFamily="18" charset="0"/>
+                                    <a:ea typeface="Cambria Math" panose="02040503050406030204" pitchFamily="18" charset="0"/>
+                                  </a:rPr>
+                                  <m:t>𝑁</m:t>
+                                </m:r>
+                              </m:e>
+                              <m:sub>
+                                <m:r>
+                                  <a:rPr lang="en-US" b="0" i="1" smtClean="0">
+                                    <a:latin typeface="Cambria Math" panose="02040503050406030204" pitchFamily="18" charset="0"/>
+                                    <a:ea typeface="Cambria Math" panose="02040503050406030204" pitchFamily="18" charset="0"/>
+                                  </a:rPr>
+                                  <m:t>1</m:t>
+                                </m:r>
+                              </m:sub>
+                            </m:sSub>
+                            <m:r>
+                              <a:rPr lang="en-US" b="0" i="1" smtClean="0">
+                                <a:latin typeface="Cambria Math" panose="02040503050406030204" pitchFamily="18" charset="0"/>
+                                <a:ea typeface="Cambria Math" panose="02040503050406030204" pitchFamily="18" charset="0"/>
+                              </a:rPr>
+                              <m:t>+</m:t>
+                            </m:r>
+                            <m:sSub>
+                              <m:sSubPr>
+                                <m:ctrlPr>
+                                  <a:rPr lang="en-US" b="0" i="1" smtClean="0">
+                                    <a:latin typeface="Cambria Math" panose="02040503050406030204" pitchFamily="18" charset="0"/>
+                                    <a:ea typeface="Cambria Math" panose="02040503050406030204" pitchFamily="18" charset="0"/>
+                                  </a:rPr>
+                                </m:ctrlPr>
+                              </m:sSubPr>
+                              <m:e>
+                                <m:r>
+                                  <a:rPr lang="en-US" b="0" i="1" smtClean="0">
+                                    <a:latin typeface="Cambria Math" panose="02040503050406030204" pitchFamily="18" charset="0"/>
+                                    <a:ea typeface="Cambria Math" panose="02040503050406030204" pitchFamily="18" charset="0"/>
+                                  </a:rPr>
+                                  <m:t>𝐻</m:t>
+                                </m:r>
+                              </m:e>
+                              <m:sub>
+                                <m:r>
+                                  <a:rPr lang="en-US" b="0" i="1" smtClean="0">
+                                    <a:latin typeface="Cambria Math" panose="02040503050406030204" pitchFamily="18" charset="0"/>
+                                    <a:ea typeface="Cambria Math" panose="02040503050406030204" pitchFamily="18" charset="0"/>
+                                  </a:rPr>
+                                  <m:t>𝑒𝑥𝑝</m:t>
+                                </m:r>
+                                <m:r>
+                                  <a:rPr lang="en-US" b="0" i="1" smtClean="0">
+                                    <a:latin typeface="Cambria Math" panose="02040503050406030204" pitchFamily="18" charset="0"/>
+                                    <a:ea typeface="Cambria Math" panose="02040503050406030204" pitchFamily="18" charset="0"/>
+                                  </a:rPr>
+                                  <m:t>2</m:t>
+                                </m:r>
+                              </m:sub>
+                            </m:sSub>
+                            <m:r>
+                              <a:rPr lang="en-US" b="0" i="1" smtClean="0">
+                                <a:latin typeface="Cambria Math" panose="02040503050406030204" pitchFamily="18" charset="0"/>
+                                <a:ea typeface="Cambria Math" panose="02040503050406030204" pitchFamily="18" charset="0"/>
+                              </a:rPr>
+                              <m:t>×</m:t>
+                            </m:r>
+                            <m:sSub>
+                              <m:sSubPr>
+                                <m:ctrlPr>
+                                  <a:rPr lang="en-US" b="0" i="1" smtClean="0">
+                                    <a:latin typeface="Cambria Math" panose="02040503050406030204" pitchFamily="18" charset="0"/>
+                                    <a:ea typeface="Cambria Math" panose="02040503050406030204" pitchFamily="18" charset="0"/>
+                                  </a:rPr>
+                                </m:ctrlPr>
+                              </m:sSubPr>
+                              <m:e>
+                                <m:r>
+                                  <a:rPr lang="en-US" b="0" i="1" smtClean="0">
+                                    <a:latin typeface="Cambria Math" panose="02040503050406030204" pitchFamily="18" charset="0"/>
+                                    <a:ea typeface="Cambria Math" panose="02040503050406030204" pitchFamily="18" charset="0"/>
+                                  </a:rPr>
+                                  <m:t>𝑁</m:t>
+                                </m:r>
+                              </m:e>
+                              <m:sub>
+                                <m:r>
+                                  <a:rPr lang="en-US" b="0" i="1" smtClean="0">
+                                    <a:latin typeface="Cambria Math" panose="02040503050406030204" pitchFamily="18" charset="0"/>
+                                    <a:ea typeface="Cambria Math" panose="02040503050406030204" pitchFamily="18" charset="0"/>
+                                  </a:rPr>
+                                  <m:t>2</m:t>
+                                </m:r>
+                              </m:sub>
+                            </m:sSub>
+                            <m:r>
+                              <a:rPr lang="en-US" b="0" i="1" smtClean="0">
+                                <a:latin typeface="Cambria Math" panose="02040503050406030204" pitchFamily="18" charset="0"/>
+                                <a:ea typeface="Cambria Math" panose="02040503050406030204" pitchFamily="18" charset="0"/>
+                              </a:rPr>
+                              <m:t>+</m:t>
+                            </m:r>
+                            <m:sSub>
+                              <m:sSubPr>
+                                <m:ctrlPr>
+                                  <a:rPr lang="en-US" b="0" i="1" smtClean="0">
+                                    <a:latin typeface="Cambria Math" panose="02040503050406030204" pitchFamily="18" charset="0"/>
+                                    <a:ea typeface="Cambria Math" panose="02040503050406030204" pitchFamily="18" charset="0"/>
+                                  </a:rPr>
+                                </m:ctrlPr>
+                              </m:sSubPr>
+                              <m:e>
+                                <m:r>
+                                  <a:rPr lang="en-US" b="0" i="1" smtClean="0">
+                                    <a:latin typeface="Cambria Math" panose="02040503050406030204" pitchFamily="18" charset="0"/>
+                                    <a:ea typeface="Cambria Math" panose="02040503050406030204" pitchFamily="18" charset="0"/>
+                                  </a:rPr>
+                                  <m:t>𝐻</m:t>
+                                </m:r>
+                              </m:e>
+                              <m:sub>
+                                <m:r>
+                                  <a:rPr lang="en-US" b="0" i="1" smtClean="0">
+                                    <a:latin typeface="Cambria Math" panose="02040503050406030204" pitchFamily="18" charset="0"/>
+                                    <a:ea typeface="Cambria Math" panose="02040503050406030204" pitchFamily="18" charset="0"/>
+                                  </a:rPr>
+                                  <m:t>𝑒𝑥𝑝</m:t>
+                                </m:r>
+                                <m:r>
+                                  <a:rPr lang="en-US" b="0" i="1" smtClean="0">
+                                    <a:latin typeface="Cambria Math" panose="02040503050406030204" pitchFamily="18" charset="0"/>
+                                    <a:ea typeface="Cambria Math" panose="02040503050406030204" pitchFamily="18" charset="0"/>
+                                  </a:rPr>
+                                  <m:t>3</m:t>
+                                </m:r>
+                              </m:sub>
+                            </m:sSub>
+                            <m:r>
+                              <a:rPr lang="en-US" b="0" i="1" smtClean="0">
+                                <a:latin typeface="Cambria Math" panose="02040503050406030204" pitchFamily="18" charset="0"/>
+                                <a:ea typeface="Cambria Math" panose="02040503050406030204" pitchFamily="18" charset="0"/>
+                              </a:rPr>
+                              <m:t>×</m:t>
+                            </m:r>
+                            <m:sSub>
+                              <m:sSubPr>
+                                <m:ctrlPr>
+                                  <a:rPr lang="en-US" b="0" i="1" smtClean="0">
+                                    <a:latin typeface="Cambria Math" panose="02040503050406030204" pitchFamily="18" charset="0"/>
+                                    <a:ea typeface="Cambria Math" panose="02040503050406030204" pitchFamily="18" charset="0"/>
+                                  </a:rPr>
+                                </m:ctrlPr>
+                              </m:sSubPr>
+                              <m:e>
+                                <m:r>
+                                  <a:rPr lang="en-US" b="0" i="1" smtClean="0">
+                                    <a:latin typeface="Cambria Math" panose="02040503050406030204" pitchFamily="18" charset="0"/>
+                                    <a:ea typeface="Cambria Math" panose="02040503050406030204" pitchFamily="18" charset="0"/>
+                                  </a:rPr>
+                                  <m:t>𝑁</m:t>
+                                </m:r>
+                              </m:e>
+                              <m:sub>
+                                <m:r>
+                                  <a:rPr lang="en-US" b="0" i="1" smtClean="0">
+                                    <a:latin typeface="Cambria Math" panose="02040503050406030204" pitchFamily="18" charset="0"/>
+                                    <a:ea typeface="Cambria Math" panose="02040503050406030204" pitchFamily="18" charset="0"/>
+                                  </a:rPr>
+                                  <m:t>3</m:t>
+                                </m:r>
+                              </m:sub>
+                            </m:sSub>
+                          </m:num>
+                          <m:den>
+                            <m:sSub>
+                              <m:sSubPr>
+                                <m:ctrlPr>
+                                  <a:rPr lang="en-US" i="1" smtClean="0">
+                                    <a:latin typeface="Cambria Math" panose="02040503050406030204" pitchFamily="18" charset="0"/>
+                                  </a:rPr>
+                                </m:ctrlPr>
+                              </m:sSubPr>
+                              <m:e>
+                                <m:r>
+                                  <a:rPr lang="en-US" b="0" i="1" smtClean="0">
+                                    <a:latin typeface="Cambria Math" panose="02040503050406030204" pitchFamily="18" charset="0"/>
+                                  </a:rPr>
+                                  <m:t>𝑁</m:t>
+                                </m:r>
+                              </m:e>
+                              <m:sub>
+                                <m:r>
+                                  <a:rPr lang="en-US" b="0" i="1" smtClean="0">
+                                    <a:latin typeface="Cambria Math" panose="02040503050406030204" pitchFamily="18" charset="0"/>
+                                  </a:rPr>
+                                  <m:t>𝑇𝑜𝑡𝑎𝑙</m:t>
+                                </m:r>
+                              </m:sub>
+                            </m:sSub>
+                          </m:den>
+                        </m:f>
+                      </m:oMath>
+                    </m:oMathPara>
+                  </a14:m>
+                  <a:endParaRPr lang="en-US" dirty="0"/>
+                </a:p>
+              </p:txBody>
+            </p:sp>
+          </mc:Choice>
+          <mc:Fallback>
+            <p:sp>
+              <p:nvSpPr>
+                <p:cNvPr id="7" name="TextBox 6"/>
+                <p:cNvSpPr txBox="1">
+                  <a:spLocks noRot="1" noChangeAspect="1" noMove="1" noResize="1" noEditPoints="1" noAdjustHandles="1" noChangeArrowheads="1" noChangeShapeType="1" noTextEdit="1"/>
+                </p:cNvSpPr>
+                <p:nvPr/>
+              </p:nvSpPr>
+              <p:spPr>
+                <a:xfrm>
+                  <a:off x="75591" y="3613814"/>
+                  <a:ext cx="4084836" cy="570926"/>
+                </a:xfrm>
+                <a:prstGeom prst="rect">
+                  <a:avLst/>
+                </a:prstGeom>
+                <a:blipFill>
+                  <a:blip r:embed="rId4"/>
+                  <a:stretch>
+                    <a:fillRect b="-1075"/>
+                  </a:stretch>
+                </a:blipFill>
+              </p:spPr>
+              <p:txBody>
+                <a:bodyPr/>
+                <a:lstStyle/>
+                <a:p>
+                  <a:r>
+                    <a:rPr lang="en-US">
+                      <a:noFill/>
+                    </a:rPr>
+                    <a:t> </a:t>
+                  </a:r>
+                </a:p>
+              </p:txBody>
+            </p:sp>
+          </mc:Fallback>
+        </mc:AlternateContent>
+        <mc:AlternateContent xmlns:mc="http://schemas.openxmlformats.org/markup-compatibility/2006">
+          <mc:Choice xmlns:a14="http://schemas.microsoft.com/office/drawing/2010/main" Requires="a14">
+            <p:sp>
+              <p:nvSpPr>
+                <p:cNvPr id="8" name="TextBox 7"/>
+                <p:cNvSpPr txBox="1"/>
+                <p:nvPr/>
+              </p:nvSpPr>
+              <p:spPr>
+                <a:xfrm>
+                  <a:off x="75591" y="4498716"/>
+                  <a:ext cx="5185715" cy="525978"/>
+                </a:xfrm>
+                <a:prstGeom prst="rect">
+                  <a:avLst/>
+                </a:prstGeom>
+                <a:noFill/>
+              </p:spPr>
+              <p:txBody>
+                <a:bodyPr wrap="none" lIns="0" tIns="0" rIns="0" bIns="0" rtlCol="0">
+                  <a:spAutoFit/>
+                </a:bodyPr>
+                <a:lstStyle/>
+                <a:p>
+                  <a14:m>
+                    <m:oMathPara xmlns:m="http://schemas.openxmlformats.org/officeDocument/2006/math">
+                      <m:oMathParaPr>
+                        <m:jc m:val="centerGroup"/>
+                      </m:oMathParaPr>
+                      <m:oMath xmlns:m="http://schemas.openxmlformats.org/officeDocument/2006/math">
+                        <m:r>
+                          <a:rPr lang="en-US" i="1" smtClean="0">
+                            <a:latin typeface="Cambria Math" panose="02040503050406030204" pitchFamily="18" charset="0"/>
+                          </a:rPr>
+                          <m:t>=</m:t>
+                        </m:r>
+                        <m:f>
+                          <m:fPr>
+                            <m:ctrlPr>
+                              <a:rPr lang="en-US" i="1" smtClean="0">
+                                <a:latin typeface="Cambria Math" panose="02040503050406030204" pitchFamily="18" charset="0"/>
+                              </a:rPr>
+                            </m:ctrlPr>
+                          </m:fPr>
+                          <m:num>
+                            <m:r>
+                              <a:rPr lang="en-US" b="0" i="1" smtClean="0">
+                                <a:latin typeface="Cambria Math" panose="02040503050406030204" pitchFamily="18" charset="0"/>
+                              </a:rPr>
+                              <m:t>0.5∗500+0.455∗100+0.455∗1000</m:t>
+                            </m:r>
+                          </m:num>
+                          <m:den>
+                            <m:r>
+                              <a:rPr lang="en-US" b="0" i="1" smtClean="0">
+                                <a:latin typeface="Cambria Math" panose="02040503050406030204" pitchFamily="18" charset="0"/>
+                              </a:rPr>
+                              <m:t>1600</m:t>
+                            </m:r>
+                          </m:den>
+                        </m:f>
+                        <m:r>
+                          <a:rPr lang="en-US" b="0" i="1" smtClean="0">
+                            <a:latin typeface="Cambria Math" panose="02040503050406030204" pitchFamily="18" charset="0"/>
+                          </a:rPr>
+                          <m:t>=0.4691</m:t>
+                        </m:r>
+                      </m:oMath>
+                    </m:oMathPara>
+                  </a14:m>
+                  <a:endParaRPr lang="en-US" dirty="0"/>
+                </a:p>
+              </p:txBody>
+            </p:sp>
+          </mc:Choice>
+          <mc:Fallback>
+            <p:sp>
+              <p:nvSpPr>
+                <p:cNvPr id="8" name="TextBox 7"/>
+                <p:cNvSpPr txBox="1">
+                  <a:spLocks noRot="1" noChangeAspect="1" noMove="1" noResize="1" noEditPoints="1" noAdjustHandles="1" noChangeArrowheads="1" noChangeShapeType="1" noTextEdit="1"/>
+                </p:cNvSpPr>
+                <p:nvPr/>
+              </p:nvSpPr>
+              <p:spPr>
+                <a:xfrm>
+                  <a:off x="75591" y="4498716"/>
+                  <a:ext cx="5185715" cy="525978"/>
+                </a:xfrm>
+                <a:prstGeom prst="rect">
+                  <a:avLst/>
+                </a:prstGeom>
+                <a:blipFill>
+                  <a:blip r:embed="rId5"/>
+                  <a:stretch>
+                    <a:fillRect/>
+                  </a:stretch>
+                </a:blipFill>
+              </p:spPr>
+              <p:txBody>
+                <a:bodyPr/>
+                <a:lstStyle/>
+                <a:p>
+                  <a:r>
+                    <a:rPr lang="en-US">
+                      <a:noFill/>
+                    </a:rPr>
+                    <a:t> </a:t>
+                  </a:r>
+                </a:p>
+              </p:txBody>
+            </p:sp>
+          </mc:Fallback>
+        </mc:AlternateContent>
+      </p:grpSp>
+      <mc:AlternateContent xmlns:mc="http://schemas.openxmlformats.org/markup-compatibility/2006">
+        <mc:Choice xmlns:a14="http://schemas.microsoft.com/office/drawing/2010/main" Requires="a14">
+          <p:sp>
+            <p:nvSpPr>
+              <p:cNvPr id="10" name="TextBox 9"/>
+              <p:cNvSpPr txBox="1"/>
+              <p:nvPr/>
+            </p:nvSpPr>
+            <p:spPr>
+              <a:xfrm>
+                <a:off x="5665998" y="3291840"/>
+                <a:ext cx="5489260" cy="670761"/>
+              </a:xfrm>
+              <a:prstGeom prst="rect">
+                <a:avLst/>
+              </a:prstGeom>
+              <a:noFill/>
+            </p:spPr>
+            <p:txBody>
+              <a:bodyPr wrap="none" lIns="0" tIns="0" rIns="0" bIns="0" rtlCol="0">
+                <a:spAutoFit/>
+              </a:bodyPr>
+              <a:lstStyle/>
+              <a:p>
+                <a14:m>
+                  <m:oMathPara xmlns:m="http://schemas.openxmlformats.org/officeDocument/2006/math">
+                    <m:oMathParaPr>
+                      <m:jc m:val="centerGroup"/>
+                    </m:oMathParaPr>
+                    <m:oMath xmlns:m="http://schemas.openxmlformats.org/officeDocument/2006/math">
+                      <m:r>
+                        <a:rPr lang="en-US" i="1" smtClean="0">
+                          <a:latin typeface="Cambria Math" panose="02040503050406030204" pitchFamily="18" charset="0"/>
+                        </a:rPr>
+                        <m:t>=</m:t>
+                      </m:r>
+                      <m:r>
+                        <a:rPr lang="en-US" b="0" i="1" smtClean="0">
+                          <a:latin typeface="Cambria Math" panose="02040503050406030204" pitchFamily="18" charset="0"/>
+                        </a:rPr>
+                        <m:t>1−</m:t>
+                      </m:r>
+                      <m:nary>
+                        <m:naryPr>
+                          <m:chr m:val="∑"/>
+                          <m:subHide m:val="on"/>
+                          <m:supHide m:val="on"/>
+                          <m:ctrlPr>
+                            <a:rPr lang="en-US" b="0" i="1" smtClean="0">
+                              <a:latin typeface="Cambria Math" panose="02040503050406030204" pitchFamily="18" charset="0"/>
+                            </a:rPr>
+                          </m:ctrlPr>
+                        </m:naryPr>
+                        <m:sub/>
+                        <m:sup/>
+                        <m:e>
+                          <m:d>
+                            <m:dPr>
+                              <m:ctrlPr>
+                                <a:rPr lang="en-US" b="0" i="1" smtClean="0">
+                                  <a:latin typeface="Cambria Math" panose="02040503050406030204" pitchFamily="18" charset="0"/>
+                                </a:rPr>
+                              </m:ctrlPr>
+                            </m:dPr>
+                            <m:e>
+                              <m:sSup>
+                                <m:sSupPr>
+                                  <m:ctrlPr>
+                                    <a:rPr lang="en-US" b="0" i="1" smtClean="0">
+                                      <a:latin typeface="Cambria Math" panose="02040503050406030204" pitchFamily="18" charset="0"/>
+                                    </a:rPr>
+                                  </m:ctrlPr>
+                                </m:sSupPr>
+                                <m:e>
+                                  <m:acc>
+                                    <m:accPr>
+                                      <m:chr m:val="̅"/>
+                                      <m:ctrlPr>
+                                        <a:rPr lang="en-US" b="0" i="1" smtClean="0">
+                                          <a:latin typeface="Cambria Math" panose="02040503050406030204" pitchFamily="18" charset="0"/>
+                                        </a:rPr>
+                                      </m:ctrlPr>
+                                    </m:accPr>
+                                    <m:e>
+                                      <m:r>
+                                        <a:rPr lang="en-US" b="0" i="1" smtClean="0">
+                                          <a:latin typeface="Cambria Math" panose="02040503050406030204" pitchFamily="18" charset="0"/>
+                                        </a:rPr>
+                                        <m:t>𝑝</m:t>
+                                      </m:r>
+                                    </m:e>
+                                  </m:acc>
+                                </m:e>
+                                <m:sup>
+                                  <m:r>
+                                    <a:rPr lang="en-US" b="0" i="1" smtClean="0">
+                                      <a:latin typeface="Cambria Math" panose="02040503050406030204" pitchFamily="18" charset="0"/>
+                                    </a:rPr>
+                                    <m:t>2</m:t>
+                                  </m:r>
+                                </m:sup>
+                              </m:sSup>
+                              <m:r>
+                                <a:rPr lang="en-US" b="0" i="1" smtClean="0">
+                                  <a:latin typeface="Cambria Math" panose="02040503050406030204" pitchFamily="18" charset="0"/>
+                                </a:rPr>
+                                <m:t>+</m:t>
+                              </m:r>
+                              <m:sSup>
+                                <m:sSupPr>
+                                  <m:ctrlPr>
+                                    <a:rPr lang="en-US" b="0" i="1" smtClean="0">
+                                      <a:latin typeface="Cambria Math" panose="02040503050406030204" pitchFamily="18" charset="0"/>
+                                    </a:rPr>
+                                  </m:ctrlPr>
+                                </m:sSupPr>
+                                <m:e>
+                                  <m:acc>
+                                    <m:accPr>
+                                      <m:chr m:val="̅"/>
+                                      <m:ctrlPr>
+                                        <a:rPr lang="en-US" b="0" i="1" smtClean="0">
+                                          <a:latin typeface="Cambria Math" panose="02040503050406030204" pitchFamily="18" charset="0"/>
+                                        </a:rPr>
+                                      </m:ctrlPr>
+                                    </m:accPr>
+                                    <m:e>
+                                      <m:r>
+                                        <a:rPr lang="en-US" b="0" i="1" smtClean="0">
+                                          <a:latin typeface="Cambria Math" panose="02040503050406030204" pitchFamily="18" charset="0"/>
+                                        </a:rPr>
+                                        <m:t>𝑞</m:t>
+                                      </m:r>
+                                    </m:e>
+                                  </m:acc>
+                                </m:e>
+                                <m:sup>
+                                  <m:r>
+                                    <a:rPr lang="en-US" b="0" i="1" smtClean="0">
+                                      <a:latin typeface="Cambria Math" panose="02040503050406030204" pitchFamily="18" charset="0"/>
+                                    </a:rPr>
+                                    <m:t>2</m:t>
+                                  </m:r>
+                                </m:sup>
+                              </m:sSup>
+                            </m:e>
+                          </m:d>
+                        </m:e>
+                      </m:nary>
+                      <m:r>
+                        <a:rPr lang="en-US" b="0" i="1" smtClean="0">
+                          <a:latin typeface="Cambria Math" panose="02040503050406030204" pitchFamily="18" charset="0"/>
+                        </a:rPr>
+                        <m:t>=1−</m:t>
+                      </m:r>
+                      <m:d>
+                        <m:dPr>
+                          <m:ctrlPr>
+                            <a:rPr lang="en-US" b="0" i="1" smtClean="0">
+                              <a:latin typeface="Cambria Math" panose="02040503050406030204" pitchFamily="18" charset="0"/>
+                            </a:rPr>
+                          </m:ctrlPr>
+                        </m:dPr>
+                        <m:e>
+                          <m:r>
+                            <a:rPr lang="en-US" b="0" i="1" smtClean="0">
+                              <a:latin typeface="Cambria Math" panose="02040503050406030204" pitchFamily="18" charset="0"/>
+                            </a:rPr>
+                            <m:t>0.1727+0.3415</m:t>
+                          </m:r>
+                        </m:e>
+                      </m:d>
+                      <m:r>
+                        <a:rPr lang="en-US" b="0" i="1" smtClean="0">
+                          <a:latin typeface="Cambria Math" panose="02040503050406030204" pitchFamily="18" charset="0"/>
+                        </a:rPr>
+                        <m:t>=0.4858</m:t>
+                      </m:r>
+                    </m:oMath>
+                  </m:oMathPara>
+                </a14:m>
+                <a:endParaRPr lang="en-US" dirty="0"/>
+              </a:p>
+            </p:txBody>
+          </p:sp>
+        </mc:Choice>
+        <mc:Fallback>
+          <p:sp>
+            <p:nvSpPr>
+              <p:cNvPr id="10" name="TextBox 9"/>
+              <p:cNvSpPr txBox="1">
+                <a:spLocks noRot="1" noChangeAspect="1" noMove="1" noResize="1" noEditPoints="1" noAdjustHandles="1" noChangeArrowheads="1" noChangeShapeType="1" noTextEdit="1"/>
+              </p:cNvSpPr>
+              <p:nvPr/>
+            </p:nvSpPr>
+            <p:spPr>
+              <a:xfrm>
+                <a:off x="5665998" y="3291840"/>
+                <a:ext cx="5489260" cy="670761"/>
+              </a:xfrm>
+              <a:prstGeom prst="rect">
+                <a:avLst/>
+              </a:prstGeom>
+              <a:blipFill>
+                <a:blip r:embed="rId6"/>
+                <a:stretch>
+                  <a:fillRect/>
+                </a:stretch>
+              </a:blipFill>
+            </p:spPr>
+            <p:txBody>
+              <a:bodyPr/>
+              <a:lstStyle/>
+              <a:p>
+                <a:r>
+                  <a:rPr lang="en-US">
+                    <a:noFill/>
+                  </a:rPr>
+                  <a:t> </a:t>
+                </a:r>
+              </a:p>
+            </p:txBody>
+          </p:sp>
+        </mc:Fallback>
+      </mc:AlternateContent>
+    </p:spTree>
+    <p:extLst>
+      <p:ext uri="{BB962C8B-B14F-4D97-AF65-F5344CB8AC3E}">
+        <p14:creationId xmlns:p14="http://schemas.microsoft.com/office/powerpoint/2010/main" val="2451478209"/>
+      </p:ext>
+    </p:extLst>
+  </p:cSld>
+  <p:clrMapOvr>
+    <a:masterClrMapping/>
+  </p:clrMapOvr>
+</p:sld>
+</file>
+
 <file path=ppt/theme/theme1.xml><?xml version="1.0" encoding="utf-8"?>
 <a:theme xmlns:a="http://schemas.openxmlformats.org/drawingml/2006/main" name="Office Theme">
   <a:themeElements>

</xml_diff>